<commit_message>
SCR 05 Quelle und Blocksatz
</commit_message>
<xml_diff>
--- a/training-cards/music moves/Scrum (SCR)/ger/apprentice/ger_SCR_05_Plan_Deinen_Sprint_MM_A.pptx
+++ b/training-cards/music moves/Scrum (SCR)/ger/apprentice/ger_SCR_05_Plan_Deinen_Sprint_MM_A.pptx
@@ -303,7 +303,7 @@
           <a:p>
             <a:fld id="{42F8D20A-7728-F14A-A40D-5966CD11A61A}" type="datetimeFigureOut">
               <a:rPr lang="de-DE" smtClean="0"/>
-              <a:t>23.07.23</a:t>
+              <a:t>01.08.24</a:t>
             </a:fld>
             <a:endParaRPr lang="de-DE"/>
           </a:p>
@@ -471,7 +471,7 @@
           <a:p>
             <a:fld id="{42F8D20A-7728-F14A-A40D-5966CD11A61A}" type="datetimeFigureOut">
               <a:rPr lang="de-DE" smtClean="0"/>
-              <a:t>23.07.23</a:t>
+              <a:t>01.08.24</a:t>
             </a:fld>
             <a:endParaRPr lang="de-DE"/>
           </a:p>
@@ -649,7 +649,7 @@
           <a:p>
             <a:fld id="{42F8D20A-7728-F14A-A40D-5966CD11A61A}" type="datetimeFigureOut">
               <a:rPr lang="de-DE" smtClean="0"/>
-              <a:t>23.07.23</a:t>
+              <a:t>01.08.24</a:t>
             </a:fld>
             <a:endParaRPr lang="de-DE"/>
           </a:p>
@@ -817,7 +817,7 @@
           <a:p>
             <a:fld id="{42F8D20A-7728-F14A-A40D-5966CD11A61A}" type="datetimeFigureOut">
               <a:rPr lang="de-DE" smtClean="0"/>
-              <a:t>23.07.23</a:t>
+              <a:t>01.08.24</a:t>
             </a:fld>
             <a:endParaRPr lang="de-DE"/>
           </a:p>
@@ -1062,7 +1062,7 @@
           <a:p>
             <a:fld id="{42F8D20A-7728-F14A-A40D-5966CD11A61A}" type="datetimeFigureOut">
               <a:rPr lang="de-DE" smtClean="0"/>
-              <a:t>23.07.23</a:t>
+              <a:t>01.08.24</a:t>
             </a:fld>
             <a:endParaRPr lang="de-DE"/>
           </a:p>
@@ -1347,7 +1347,7 @@
           <a:p>
             <a:fld id="{42F8D20A-7728-F14A-A40D-5966CD11A61A}" type="datetimeFigureOut">
               <a:rPr lang="de-DE" smtClean="0"/>
-              <a:t>23.07.23</a:t>
+              <a:t>01.08.24</a:t>
             </a:fld>
             <a:endParaRPr lang="de-DE"/>
           </a:p>
@@ -1771,7 +1771,7 @@
           <a:p>
             <a:fld id="{42F8D20A-7728-F14A-A40D-5966CD11A61A}" type="datetimeFigureOut">
               <a:rPr lang="de-DE" smtClean="0"/>
-              <a:t>23.07.23</a:t>
+              <a:t>01.08.24</a:t>
             </a:fld>
             <a:endParaRPr lang="de-DE"/>
           </a:p>
@@ -1888,7 +1888,7 @@
           <a:p>
             <a:fld id="{42F8D20A-7728-F14A-A40D-5966CD11A61A}" type="datetimeFigureOut">
               <a:rPr lang="de-DE" smtClean="0"/>
-              <a:t>23.07.23</a:t>
+              <a:t>01.08.24</a:t>
             </a:fld>
             <a:endParaRPr lang="de-DE"/>
           </a:p>
@@ -1983,7 +1983,7 @@
           <a:p>
             <a:fld id="{42F8D20A-7728-F14A-A40D-5966CD11A61A}" type="datetimeFigureOut">
               <a:rPr lang="de-DE" smtClean="0"/>
-              <a:t>23.07.23</a:t>
+              <a:t>01.08.24</a:t>
             </a:fld>
             <a:endParaRPr lang="de-DE"/>
           </a:p>
@@ -2258,7 +2258,7 @@
           <a:p>
             <a:fld id="{42F8D20A-7728-F14A-A40D-5966CD11A61A}" type="datetimeFigureOut">
               <a:rPr lang="de-DE" smtClean="0"/>
-              <a:t>23.07.23</a:t>
+              <a:t>01.08.24</a:t>
             </a:fld>
             <a:endParaRPr lang="de-DE"/>
           </a:p>
@@ -2510,7 +2510,7 @@
           <a:p>
             <a:fld id="{42F8D20A-7728-F14A-A40D-5966CD11A61A}" type="datetimeFigureOut">
               <a:rPr lang="de-DE" smtClean="0"/>
-              <a:t>23.07.23</a:t>
+              <a:t>01.08.24</a:t>
             </a:fld>
             <a:endParaRPr lang="de-DE"/>
           </a:p>
@@ -2721,7 +2721,7 @@
           <a:p>
             <a:fld id="{42F8D20A-7728-F14A-A40D-5966CD11A61A}" type="datetimeFigureOut">
               <a:rPr lang="de-DE" smtClean="0"/>
-              <a:t>23.07.23</a:t>
+              <a:t>01.08.24</a:t>
             </a:fld>
             <a:endParaRPr lang="de-DE"/>
           </a:p>
@@ -3332,7 +3332,7 @@
         <p:spPr>
           <a:xfrm>
             <a:off x="865450" y="1339459"/>
-            <a:ext cx="5942053" cy="3554820"/>
+            <a:ext cx="6228829" cy="3785652"/>
           </a:xfrm>
           <a:prstGeom prst="rect">
             <a:avLst/>
@@ -3350,7 +3350,7 @@
           </a:bodyPr>
           <a:lstStyle/>
           <a:p>
-            <a:pPr marL="271463" lvl="0" indent="-271463">
+            <a:pPr marL="271463" lvl="0" indent="-271463" algn="just">
               <a:buSzPct val="170000"/>
               <a:buBlip>
                 <a:blip r:embed="rId3"/>
@@ -3374,7 +3374,7 @@
                 <a:latin typeface="Avenir Book"/>
                 <a:cs typeface="Avenir Book"/>
               </a:rPr>
-              <a:t>Planing</a:t>
+              <a:t>Planning</a:t>
             </a:r>
             <a:r>
               <a:rPr lang="de-DE" sz="900" dirty="0">
@@ -3384,7 +3384,7 @@
                 <a:latin typeface="Avenir Book"/>
                 <a:cs typeface="Avenir Book"/>
               </a:rPr>
-              <a:t>“ ist eines der </a:t>
+              <a:t>“ (</a:t>
             </a:r>
             <a:r>
               <a:rPr lang="de-DE" sz="900" dirty="0" err="1">
@@ -3394,7 +3394,7 @@
                 <a:latin typeface="Avenir Book"/>
                 <a:cs typeface="Avenir Book"/>
               </a:rPr>
-              <a:t>Scrumereignisse</a:t>
+              <a:t>Schwaber</a:t>
             </a:r>
             <a:r>
               <a:rPr lang="de-DE" sz="900" dirty="0">
@@ -3404,7 +3404,7 @@
                 <a:latin typeface="Avenir Book"/>
                 <a:cs typeface="Avenir Book"/>
               </a:rPr>
-              <a:t>. Das gesamte </a:t>
+              <a:t>/Sutherland 2020, S. 9) ist eines der </a:t>
             </a:r>
             <a:r>
               <a:rPr lang="de-DE" sz="900" dirty="0" err="1">
@@ -3424,7 +3424,7 @@
                 <a:latin typeface="Avenir Book"/>
                 <a:cs typeface="Avenir Book"/>
               </a:rPr>
-              <a:t> Team trifft sich um den nächsten Sprint (siehe SCR-01) zu besprechen. Dabei wird das Sprint </a:t>
+              <a:t>-Ereignisse. Das gesamte </a:t>
             </a:r>
             <a:r>
               <a:rPr lang="de-DE" sz="900" dirty="0" err="1">
@@ -3434,7 +3434,7 @@
                 <a:latin typeface="Avenir Book"/>
                 <a:cs typeface="Avenir Book"/>
               </a:rPr>
-              <a:t>Backlog</a:t>
+              <a:t>Scrum</a:t>
             </a:r>
             <a:r>
               <a:rPr lang="de-DE" sz="900" dirty="0">
@@ -3444,7 +3444,7 @@
                 <a:latin typeface="Avenir Book"/>
                 <a:cs typeface="Avenir Book"/>
               </a:rPr>
-              <a:t> </a:t>
+              <a:t> Team trifft sich um den nächsten Sprint (siehe SCR 01) zu planen. Dabei wird das Sprint Backlog befüllt und somit festgelegt, welche Arbeit im nächsten Sprint voraussichtlich getan werden kann. </a:t>
             </a:r>
             <a:r>
               <a:rPr lang="de-DE" sz="900" dirty="0" err="1">
@@ -3454,7 +3454,7 @@
                 <a:latin typeface="Avenir Book"/>
                 <a:cs typeface="Avenir Book"/>
               </a:rPr>
-              <a:t>befüllt</a:t>
+              <a:t>Em</a:t>
             </a:r>
             <a:r>
               <a:rPr lang="de-DE" sz="900" dirty="0">
@@ -3464,11 +3464,31 @@
                 <a:latin typeface="Avenir Book"/>
                 <a:cs typeface="Avenir Book"/>
               </a:rPr>
-              <a:t> und somit festgelegt, welche Arbeit im nächsten Sprint voraussichtlich getan werden kann.</a:t>
-            </a:r>
-          </a:p>
-          <a:p>
-            <a:pPr lvl="0">
+              <a:t> Ende des Sprint </a:t>
+            </a:r>
+            <a:r>
+              <a:rPr lang="de-DE" sz="900" dirty="0" err="1">
+                <a:solidFill>
+                  <a:srgbClr val="747982"/>
+                </a:solidFill>
+                <a:latin typeface="Avenir Book"/>
+                <a:cs typeface="Avenir Book"/>
+              </a:rPr>
+              <a:t>Plannings</a:t>
+            </a:r>
+            <a:r>
+              <a:rPr lang="de-DE" sz="900" dirty="0">
+                <a:solidFill>
+                  <a:srgbClr val="747982"/>
+                </a:solidFill>
+                <a:latin typeface="Avenir Book"/>
+                <a:cs typeface="Avenir Book"/>
+              </a:rPr>
+              <a:t> steht der Plan für den kommenden Sprint fest.</a:t>
+            </a:r>
+          </a:p>
+          <a:p>
+            <a:pPr lvl="0" algn="just">
               <a:buSzPct val="170000"/>
             </a:pPr>
             <a:endParaRPr lang="de-DE" sz="900" dirty="0">
@@ -3480,7 +3500,7 @@
             </a:endParaRPr>
           </a:p>
           <a:p>
-            <a:pPr marL="271463" lvl="0" indent="-271463">
+            <a:pPr marL="271463" lvl="0" indent="-271463" algn="just">
               <a:buSzPct val="170000"/>
               <a:buBlip>
                 <a:blip r:embed="rId3"/>
@@ -3494,7 +3514,7 @@
                 <a:latin typeface="Avenir Book"/>
                 <a:cs typeface="Avenir Book"/>
               </a:rPr>
-              <a:t>Das Treffen ist </a:t>
+              <a:t>Vor dem Treffen macht sich der </a:t>
             </a:r>
             <a:r>
               <a:rPr lang="de-DE" sz="900" dirty="0" err="1">
@@ -3504,7 +3524,7 @@
                 <a:latin typeface="Avenir Book"/>
                 <a:cs typeface="Avenir Book"/>
               </a:rPr>
-              <a:t>timeboxed</a:t>
+              <a:t>Product</a:t>
             </a:r>
             <a:r>
               <a:rPr lang="de-DE" sz="900" dirty="0">
@@ -3514,7 +3534,7 @@
                 <a:latin typeface="Avenir Book"/>
                 <a:cs typeface="Avenir Book"/>
               </a:rPr>
-              <a:t>. Es ist auf eine Dauer von maximal 8h für 4 Wochen Sprints beschränkt. Bei kürzeren Sprints reduziert sich die </a:t>
+              <a:t> </a:t>
             </a:r>
             <a:r>
               <a:rPr lang="de-DE" sz="900" dirty="0" err="1">
@@ -3524,7 +3544,7 @@
                 <a:latin typeface="Avenir Book"/>
                 <a:cs typeface="Avenir Book"/>
               </a:rPr>
-              <a:t>Timebox</a:t>
+              <a:t>Owner</a:t>
             </a:r>
             <a:r>
               <a:rPr lang="de-DE" sz="900" dirty="0">
@@ -3534,11 +3554,124 @@
                 <a:latin typeface="Avenir Book"/>
                 <a:cs typeface="Avenir Book"/>
               </a:rPr>
-              <a:t> verhältnismäßig.</a:t>
-            </a:r>
-          </a:p>
-          <a:p>
-            <a:pPr lvl="0">
+              <a:t> Gedanken über die Produktvision. Sie wird im gesamten Team diskutiert und als  Sprint-Ziel ins Backlog aufgenommen (vgl. ebd., S. 12).</a:t>
+            </a:r>
+          </a:p>
+          <a:p>
+            <a:pPr lvl="0" algn="just">
+              <a:buSzPct val="170000"/>
+            </a:pPr>
+            <a:r>
+              <a:rPr lang="de-DE" sz="900" dirty="0">
+                <a:solidFill>
+                  <a:srgbClr val="747982"/>
+                </a:solidFill>
+                <a:latin typeface="Avenir Book"/>
+                <a:cs typeface="Avenir Book"/>
+              </a:rPr>
+              <a:t>         Wenn Du in Dein erstes Sprint </a:t>
+            </a:r>
+            <a:r>
+              <a:rPr lang="de-DE" sz="900" dirty="0" err="1">
+                <a:solidFill>
+                  <a:srgbClr val="747982"/>
+                </a:solidFill>
+                <a:latin typeface="Avenir Book"/>
+                <a:cs typeface="Avenir Book"/>
+              </a:rPr>
+              <a:t>Planning</a:t>
+            </a:r>
+            <a:r>
+              <a:rPr lang="de-DE" sz="900" dirty="0">
+                <a:solidFill>
+                  <a:srgbClr val="747982"/>
+                </a:solidFill>
+                <a:latin typeface="Avenir Book"/>
+                <a:cs typeface="Avenir Book"/>
+              </a:rPr>
+              <a:t> gehst, bist Du Dein </a:t>
+            </a:r>
+            <a:r>
+              <a:rPr lang="de-DE" sz="900" dirty="0" err="1">
+                <a:solidFill>
+                  <a:srgbClr val="747982"/>
+                </a:solidFill>
+                <a:latin typeface="Avenir Book"/>
+                <a:cs typeface="Avenir Book"/>
+              </a:rPr>
+              <a:t>Product</a:t>
+            </a:r>
+            <a:r>
+              <a:rPr lang="de-DE" sz="900" dirty="0">
+                <a:solidFill>
+                  <a:srgbClr val="747982"/>
+                </a:solidFill>
+                <a:latin typeface="Avenir Book"/>
+                <a:cs typeface="Avenir Book"/>
+              </a:rPr>
+              <a:t> </a:t>
+            </a:r>
+            <a:r>
+              <a:rPr lang="de-DE" sz="900" dirty="0" err="1">
+                <a:solidFill>
+                  <a:srgbClr val="747982"/>
+                </a:solidFill>
+                <a:latin typeface="Avenir Book"/>
+                <a:cs typeface="Avenir Book"/>
+              </a:rPr>
+              <a:t>Owner</a:t>
+            </a:r>
+            <a:r>
+              <a:rPr lang="de-DE" sz="900" dirty="0">
+                <a:solidFill>
+                  <a:srgbClr val="747982"/>
+                </a:solidFill>
+                <a:latin typeface="Avenir Book"/>
+                <a:cs typeface="Avenir Book"/>
+              </a:rPr>
+              <a:t>. Du musst also wissen, wohin </a:t>
+            </a:r>
+            <a:br>
+              <a:rPr lang="de-DE" sz="900" dirty="0">
+                <a:solidFill>
+                  <a:srgbClr val="747982"/>
+                </a:solidFill>
+                <a:latin typeface="Avenir Book"/>
+                <a:cs typeface="Avenir Book"/>
+              </a:rPr>
+            </a:br>
+            <a:r>
+              <a:rPr lang="de-DE" sz="900" dirty="0">
+                <a:solidFill>
+                  <a:srgbClr val="747982"/>
+                </a:solidFill>
+                <a:latin typeface="Avenir Book"/>
+                <a:cs typeface="Avenir Book"/>
+              </a:rPr>
+              <a:t>         Du mit Deinem Stück willst und solltest ein Sprint-Ziel formulieren können, das andere in </a:t>
+            </a:r>
+            <a:br>
+              <a:rPr lang="de-DE" sz="900" dirty="0">
+                <a:solidFill>
+                  <a:srgbClr val="747982"/>
+                </a:solidFill>
+                <a:latin typeface="Avenir Book"/>
+                <a:cs typeface="Avenir Book"/>
+              </a:rPr>
+            </a:br>
+            <a:r>
+              <a:rPr lang="de-DE" sz="900" dirty="0">
+                <a:solidFill>
+                  <a:srgbClr val="747982"/>
+                </a:solidFill>
+                <a:latin typeface="Avenir Book"/>
+                <a:cs typeface="Avenir Book"/>
+              </a:rPr>
+              <a:t>         Deinem Team verstehen oder sogar mitreißen kann.</a:t>
+            </a:r>
+          </a:p>
+          <a:p>
+            <a:pPr lvl="0" algn="just">
               <a:buSzPct val="170000"/>
             </a:pPr>
             <a:endParaRPr lang="de-DE" sz="900" dirty="0">
@@ -3550,7 +3683,7 @@
             </a:endParaRPr>
           </a:p>
           <a:p>
-            <a:pPr marL="271463" lvl="0" indent="-271463">
+            <a:pPr marL="271463" lvl="0" indent="-271463" algn="just">
               <a:buSzPct val="170000"/>
               <a:buBlip>
                 <a:blip r:embed="rId3"/>
@@ -3564,71 +3697,11 @@
                 <a:latin typeface="Avenir Book"/>
                 <a:cs typeface="Avenir Book"/>
               </a:rPr>
-              <a:t>Vor dem </a:t>
-            </a:r>
-            <a:r>
-              <a:rPr lang="de-DE" sz="900" dirty="0" err="1">
-                <a:solidFill>
-                  <a:srgbClr val="747982"/>
-                </a:solidFill>
-                <a:latin typeface="Avenir Book"/>
-                <a:cs typeface="Avenir Book"/>
-              </a:rPr>
-              <a:t>meeting</a:t>
-            </a:r>
-            <a:r>
-              <a:rPr lang="de-DE" sz="900" dirty="0">
-                <a:solidFill>
-                  <a:srgbClr val="747982"/>
-                </a:solidFill>
-                <a:latin typeface="Avenir Book"/>
-                <a:cs typeface="Avenir Book"/>
-              </a:rPr>
-              <a:t> macht sich der </a:t>
-            </a:r>
-            <a:r>
-              <a:rPr lang="de-DE" sz="900" dirty="0" err="1">
-                <a:solidFill>
-                  <a:srgbClr val="747982"/>
-                </a:solidFill>
-                <a:latin typeface="Avenir Book"/>
-                <a:cs typeface="Avenir Book"/>
-              </a:rPr>
-              <a:t>Product</a:t>
-            </a:r>
-            <a:r>
-              <a:rPr lang="de-DE" sz="900" dirty="0">
-                <a:solidFill>
-                  <a:srgbClr val="747982"/>
-                </a:solidFill>
-                <a:latin typeface="Avenir Book"/>
-                <a:cs typeface="Avenir Book"/>
-              </a:rPr>
-              <a:t> </a:t>
-            </a:r>
-            <a:r>
-              <a:rPr lang="de-DE" sz="900" dirty="0" err="1">
-                <a:solidFill>
-                  <a:srgbClr val="747982"/>
-                </a:solidFill>
-                <a:latin typeface="Avenir Book"/>
-                <a:cs typeface="Avenir Book"/>
-              </a:rPr>
-              <a:t>Owner</a:t>
-            </a:r>
-            <a:r>
-              <a:rPr lang="de-DE" sz="900" dirty="0">
-                <a:solidFill>
-                  <a:srgbClr val="747982"/>
-                </a:solidFill>
-                <a:latin typeface="Avenir Book"/>
-                <a:cs typeface="Avenir Book"/>
-              </a:rPr>
-              <a:t> Gedanken über die Produktvision und bringt sie in die Besprechung mit.</a:t>
-            </a:r>
-          </a:p>
-          <a:p>
-            <a:pPr lvl="0">
+              <a:t>Wenn Du mit anderen Musikern zusammen ein Konzert vorbereitest oder in einer Band, einem Ensemble oder einem Klassenverband musizierst, kann ein gemeinsames Bewusstsein über den Wert eurer Proben entstehen. Eine Diskussion darüber, wohin die gemeinsame Reise mit bestimmten Stücken geht, was das Sprint-Ziel ist, welche Proben-Ziele daraus entstehen und wie genau man diese Ziele erreichen möchte, gibt dem darauf folgenden Üben Substanz und Ausrichtung. </a:t>
+            </a:r>
+          </a:p>
+          <a:p>
+            <a:pPr lvl="0" algn="just">
               <a:buSzPct val="170000"/>
             </a:pPr>
             <a:endParaRPr lang="de-DE" sz="900" dirty="0">
@@ -3640,7 +3713,7 @@
             </a:endParaRPr>
           </a:p>
           <a:p>
-            <a:pPr marL="271463" lvl="0" indent="-271463">
+            <a:pPr marL="271463" lvl="0" indent="-271463" algn="just">
               <a:buSzPct val="170000"/>
               <a:buBlip>
                 <a:blip r:embed="rId3"/>
@@ -3654,7 +3727,7 @@
                 <a:latin typeface="Avenir Book"/>
                 <a:cs typeface="Avenir Book"/>
               </a:rPr>
-              <a:t>Wenn Du in Dein erstes Sprint </a:t>
+              <a:t>Auch wenn in einer Gruppe von </a:t>
             </a:r>
             <a:r>
               <a:rPr lang="de-DE" sz="900" dirty="0" err="1">
@@ -3664,7 +3737,7 @@
                 <a:latin typeface="Avenir Book"/>
                 <a:cs typeface="Avenir Book"/>
               </a:rPr>
-              <a:t>Planing</a:t>
+              <a:t>Kommiliton</a:t>
             </a:r>
             <a:r>
               <a:rPr lang="de-DE" sz="900" dirty="0">
@@ -3674,7 +3747,7 @@
                 <a:latin typeface="Avenir Book"/>
                 <a:cs typeface="Avenir Book"/>
               </a:rPr>
-              <a:t> gehst, bist Du Dein </a:t>
+              <a:t>*innen jede*</a:t>
             </a:r>
             <a:r>
               <a:rPr lang="de-DE" sz="900" dirty="0" err="1">
@@ -3684,7 +3757,7 @@
                 <a:latin typeface="Avenir Book"/>
                 <a:cs typeface="Avenir Book"/>
               </a:rPr>
-              <a:t>Product</a:t>
+              <a:t>r</a:t>
             </a:r>
             <a:r>
               <a:rPr lang="de-DE" sz="900" dirty="0">
@@ -3694,31 +3767,207 @@
                 <a:latin typeface="Avenir Book"/>
                 <a:cs typeface="Avenir Book"/>
               </a:rPr>
-              <a:t> </a:t>
-            </a:r>
-            <a:r>
-              <a:rPr lang="de-DE" sz="900" dirty="0" err="1">
-                <a:solidFill>
-                  <a:srgbClr val="747982"/>
-                </a:solidFill>
-                <a:latin typeface="Avenir Book"/>
-                <a:cs typeface="Avenir Book"/>
-              </a:rPr>
-              <a:t>Owner</a:t>
-            </a:r>
-            <a:r>
-              <a:rPr lang="de-DE" sz="900" dirty="0">
-                <a:solidFill>
-                  <a:srgbClr val="747982"/>
-                </a:solidFill>
-                <a:latin typeface="Avenir Book"/>
-                <a:cs typeface="Avenir Book"/>
-              </a:rPr>
-              <a:t>. Du musst also wissen, wohin Du mit Deinem Stück willst und solltest eine Vision von Deinem Stück formulieren können, die andere in Deinem Team verstehen oder sogar mitreißen kann.</a:t>
-            </a:r>
-          </a:p>
-          <a:p>
-            <a:pPr lvl="0">
+              <a:t> nur für sich selbst plant, kann man durch eine gemeinsame Planung viel von den anderen lernen. Man kommt heraus aus seinem Schneckenhaus, um sich mit der Übe-Realität anderer Musiker abzugleichen. Was schaffen andere in welcher Zeit? Welche Sprint-Ziele legen sie fest? Wann hört jemand auf zu üben? Welche Qualitätsstandards werden eingehalten?</a:t>
+            </a:r>
+          </a:p>
+          <a:p>
+            <a:pPr marL="271463" lvl="0" indent="-271463" algn="just">
+              <a:buSzPct val="170000"/>
+              <a:buBlip>
+                <a:blip r:embed="rId3"/>
+              </a:buBlip>
+            </a:pPr>
+            <a:endParaRPr lang="de-DE" sz="900" dirty="0">
+              <a:solidFill>
+                <a:srgbClr val="747982"/>
+              </a:solidFill>
+              <a:latin typeface="Avenir Book"/>
+              <a:cs typeface="Avenir Book"/>
+            </a:endParaRPr>
+          </a:p>
+          <a:p>
+            <a:pPr lvl="0" algn="just">
+              <a:buSzPct val="170000"/>
+            </a:pPr>
+            <a:endParaRPr lang="de-DE" sz="800" dirty="0">
+              <a:solidFill>
+                <a:srgbClr val="747982"/>
+              </a:solidFill>
+              <a:latin typeface="Avenir Book"/>
+              <a:cs typeface="Avenir Book"/>
+            </a:endParaRPr>
+          </a:p>
+          <a:p>
+            <a:pPr algn="just">
+              <a:buSzPct val="170000"/>
+            </a:pPr>
+            <a:r>
+              <a:rPr lang="de-DE" sz="800" dirty="0">
+                <a:solidFill>
+                  <a:schemeClr val="tx1">
+                    <a:lumMod val="65000"/>
+                    <a:lumOff val="35000"/>
+                  </a:schemeClr>
+                </a:solidFill>
+              </a:rPr>
+              <a:t>Quelle: </a:t>
+            </a:r>
+            <a:r>
+              <a:rPr lang="de-DE" sz="800" b="1" dirty="0" err="1">
+                <a:solidFill>
+                  <a:schemeClr val="tx1">
+                    <a:lumMod val="65000"/>
+                    <a:lumOff val="35000"/>
+                  </a:schemeClr>
+                </a:solidFill>
+              </a:rPr>
+              <a:t>Schwaber</a:t>
+            </a:r>
+            <a:r>
+              <a:rPr lang="de-DE" sz="800" dirty="0">
+                <a:solidFill>
+                  <a:schemeClr val="tx1">
+                    <a:lumMod val="65000"/>
+                    <a:lumOff val="35000"/>
+                  </a:schemeClr>
+                </a:solidFill>
+              </a:rPr>
+              <a:t>, Ken/Sutherland, Jeff (2020): Der </a:t>
+            </a:r>
+            <a:r>
+              <a:rPr lang="de-DE" sz="800" dirty="0" err="1">
+                <a:solidFill>
+                  <a:schemeClr val="tx1">
+                    <a:lumMod val="65000"/>
+                    <a:lumOff val="35000"/>
+                  </a:schemeClr>
+                </a:solidFill>
+              </a:rPr>
+              <a:t>Scrum</a:t>
+            </a:r>
+            <a:r>
+              <a:rPr lang="de-DE" sz="800" dirty="0">
+                <a:solidFill>
+                  <a:schemeClr val="tx1">
+                    <a:lumMod val="65000"/>
+                    <a:lumOff val="35000"/>
+                  </a:schemeClr>
+                </a:solidFill>
+              </a:rPr>
+              <a:t> Guide. Der gültige Leitfaden für </a:t>
+            </a:r>
+            <a:r>
+              <a:rPr lang="de-DE" sz="800" dirty="0" err="1">
+                <a:solidFill>
+                  <a:schemeClr val="tx1">
+                    <a:lumMod val="65000"/>
+                    <a:lumOff val="35000"/>
+                  </a:schemeClr>
+                </a:solidFill>
+              </a:rPr>
+              <a:t>Scrum</a:t>
+            </a:r>
+            <a:r>
+              <a:rPr lang="de-DE" sz="800" dirty="0">
+                <a:solidFill>
+                  <a:schemeClr val="tx1">
+                    <a:lumMod val="65000"/>
+                    <a:lumOff val="35000"/>
+                  </a:schemeClr>
+                </a:solidFill>
+              </a:rPr>
+              <a:t>: Die Spielregeln.  http://</a:t>
+            </a:r>
+            <a:r>
+              <a:rPr lang="de-DE" sz="800" dirty="0" err="1">
+                <a:solidFill>
+                  <a:schemeClr val="tx1">
+                    <a:lumMod val="65000"/>
+                    <a:lumOff val="35000"/>
+                  </a:schemeClr>
+                </a:solidFill>
+              </a:rPr>
+              <a:t>scrumguides.org</a:t>
+            </a:r>
+            <a:r>
+              <a:rPr lang="de-DE" sz="800" dirty="0">
+                <a:solidFill>
+                  <a:schemeClr val="tx1">
+                    <a:lumMod val="65000"/>
+                    <a:lumOff val="35000"/>
+                  </a:schemeClr>
+                </a:solidFill>
+              </a:rPr>
+              <a:t>/</a:t>
+            </a:r>
+            <a:r>
+              <a:rPr lang="de-DE" sz="800" dirty="0" err="1">
+                <a:solidFill>
+                  <a:schemeClr val="tx1">
+                    <a:lumMod val="65000"/>
+                    <a:lumOff val="35000"/>
+                  </a:schemeClr>
+                </a:solidFill>
+              </a:rPr>
+              <a:t>docs</a:t>
+            </a:r>
+            <a:r>
+              <a:rPr lang="de-DE" sz="800" dirty="0">
+                <a:solidFill>
+                  <a:schemeClr val="tx1">
+                    <a:lumMod val="65000"/>
+                    <a:lumOff val="35000"/>
+                  </a:schemeClr>
+                </a:solidFill>
+              </a:rPr>
+              <a:t>/   </a:t>
+            </a:r>
+            <a:br>
+              <a:rPr lang="de-DE" sz="800" dirty="0">
+                <a:solidFill>
+                  <a:schemeClr val="tx1">
+                    <a:lumMod val="65000"/>
+                    <a:lumOff val="35000"/>
+                  </a:schemeClr>
+                </a:solidFill>
+              </a:rPr>
+            </a:br>
+            <a:r>
+              <a:rPr lang="de-DE" sz="800" dirty="0">
+                <a:solidFill>
+                  <a:schemeClr val="tx1">
+                    <a:lumMod val="65000"/>
+                    <a:lumOff val="35000"/>
+                  </a:schemeClr>
+                </a:solidFill>
+              </a:rPr>
+              <a:t>                  </a:t>
+            </a:r>
+            <a:r>
+              <a:rPr lang="de-DE" sz="800" dirty="0" err="1">
+                <a:solidFill>
+                  <a:schemeClr val="tx1">
+                    <a:lumMod val="65000"/>
+                    <a:lumOff val="35000"/>
+                  </a:schemeClr>
+                </a:solidFill>
+              </a:rPr>
+              <a:t>scrumguide</a:t>
+            </a:r>
+            <a:r>
+              <a:rPr lang="de-DE" sz="800" dirty="0">
+                <a:solidFill>
+                  <a:schemeClr val="tx1">
+                    <a:lumMod val="65000"/>
+                    <a:lumOff val="35000"/>
+                  </a:schemeClr>
+                </a:solidFill>
+              </a:rPr>
+              <a:t>/v2020/2020-Scrum-Guide-German.pdf. Abgerufen am 25. Juli 2024</a:t>
+            </a:r>
+          </a:p>
+          <a:p>
+            <a:pPr lvl="0" algn="just">
               <a:buSzPct val="170000"/>
             </a:pPr>
             <a:endParaRPr lang="de-DE" sz="900" dirty="0">
@@ -3730,95 +3979,7 @@
             </a:endParaRPr>
           </a:p>
           <a:p>
-            <a:pPr marL="271463" lvl="0" indent="-271463">
-              <a:buSzPct val="170000"/>
-              <a:buBlip>
-                <a:blip r:embed="rId3"/>
-              </a:buBlip>
-            </a:pPr>
-            <a:r>
-              <a:rPr lang="de-DE" sz="900" dirty="0">
-                <a:solidFill>
-                  <a:srgbClr val="747982"/>
-                </a:solidFill>
-                <a:latin typeface="Avenir Book"/>
-                <a:cs typeface="Avenir Book"/>
-              </a:rPr>
-              <a:t>Wenn Du mit anderen Musikern zusammen ein Konzert vorbereitest oder in einer Band, einem Ensemble oder einem Klassenverband musizierst kann ein gemeinsames Qualitätsbewusstsein für Eure Vorträge entstehen. Eine Diskussion darüber, wohin die gemeinsame Reise mit einem bestimmten Stück geht, was das dahinterstehende Ziel oder der Traum ist, warum man dieses Stück musiziert und wie man sich den Weg dorthin vorstellt, gibt dem nachstehenden Üben Substanz und ein Fundament. </a:t>
-            </a:r>
-          </a:p>
-          <a:p>
-            <a:pPr lvl="0">
-              <a:buSzPct val="170000"/>
-            </a:pPr>
-            <a:endParaRPr lang="de-DE" sz="900" dirty="0">
-              <a:solidFill>
-                <a:srgbClr val="747982"/>
-              </a:solidFill>
-              <a:latin typeface="Avenir Book"/>
-              <a:cs typeface="Avenir Book"/>
-            </a:endParaRPr>
-          </a:p>
-          <a:p>
-            <a:pPr marL="271463" lvl="0" indent="-271463">
-              <a:buSzPct val="170000"/>
-              <a:buBlip>
-                <a:blip r:embed="rId3"/>
-              </a:buBlip>
-            </a:pPr>
-            <a:r>
-              <a:rPr lang="de-DE" sz="900" dirty="0">
-                <a:solidFill>
-                  <a:srgbClr val="747982"/>
-                </a:solidFill>
-                <a:latin typeface="Avenir Book"/>
-                <a:cs typeface="Avenir Book"/>
-              </a:rPr>
-              <a:t>Durch die gemeinsame Planung wird man mitverantwortlich für den </a:t>
-            </a:r>
-            <a:r>
-              <a:rPr lang="de-DE" sz="900" dirty="0" err="1">
-                <a:solidFill>
-                  <a:srgbClr val="747982"/>
-                </a:solidFill>
-                <a:latin typeface="Avenir Book"/>
-                <a:cs typeface="Avenir Book"/>
-              </a:rPr>
-              <a:t>Übeprozess</a:t>
-            </a:r>
-            <a:r>
-              <a:rPr lang="de-DE" sz="900" dirty="0">
-                <a:solidFill>
-                  <a:srgbClr val="747982"/>
-                </a:solidFill>
-                <a:latin typeface="Avenir Book"/>
-                <a:cs typeface="Avenir Book"/>
-              </a:rPr>
-              <a:t> der anderen. Man kommt heraus aus seinem Schneckenhaus um sich mit der </a:t>
-            </a:r>
-            <a:r>
-              <a:rPr lang="de-DE" sz="900" dirty="0" err="1">
-                <a:solidFill>
-                  <a:srgbClr val="747982"/>
-                </a:solidFill>
-                <a:latin typeface="Avenir Book"/>
-                <a:cs typeface="Avenir Book"/>
-              </a:rPr>
-              <a:t>Überealität</a:t>
-            </a:r>
-            <a:r>
-              <a:rPr lang="de-DE" sz="900" dirty="0">
-                <a:solidFill>
-                  <a:srgbClr val="747982"/>
-                </a:solidFill>
-                <a:latin typeface="Avenir Book"/>
-                <a:cs typeface="Avenir Book"/>
-              </a:rPr>
-              <a:t> anderer Musiker abzugleichen. Was schaffen andere in welcher Zeit? Wann hört jemand auf zu üben, weil sie für ihn fertig ist? Welche Qualitätsstandards werden eingehalten?</a:t>
-            </a:r>
-          </a:p>
-          <a:p>
-            <a:pPr lvl="0">
+            <a:pPr lvl="0" algn="just">
               <a:buSzPct val="170000"/>
             </a:pPr>
             <a:endParaRPr lang="de-DE" sz="900" dirty="0">
@@ -4151,7 +4312,7 @@
         <p:spPr>
           <a:xfrm>
             <a:off x="865450" y="1584056"/>
-            <a:ext cx="5942053" cy="2092881"/>
+            <a:ext cx="5942053" cy="2400657"/>
           </a:xfrm>
           <a:prstGeom prst="rect">
             <a:avLst/>
@@ -4169,7 +4330,7 @@
           </a:bodyPr>
           <a:lstStyle/>
           <a:p>
-            <a:pPr marL="271463" indent="-271463">
+            <a:pPr marL="271463" indent="-271463" algn="just">
               <a:buSzPct val="170000"/>
               <a:buBlip>
                 <a:blip r:embed="rId3"/>
@@ -4183,11 +4344,11 @@
                 <a:latin typeface="Avenir Book"/>
                 <a:cs typeface="Avenir Book"/>
               </a:rPr>
-              <a:t>Setze mit Deinem Team vor Deinen nächsten beiden Sprints (siehe SCR 01) jeweils ein Treffen zur Sprintplanung an. Gebt Euch gegenseitig Feedback über die Machbarkeit der geplanten Aufgaben in der angesetzten Zeit. Sprecht über eure „Produktvision“ und gleicht Euer Qualitätsbewusstsein ab.</a:t>
-            </a:r>
-          </a:p>
-          <a:p>
-            <a:pPr>
+              <a:t>Setze mit Deinem Team vor Deinen nächsten beiden Sprints (siehe SCR 01) jeweils ein Treffen zur Sprintplanung an. Gebt Euch gegenseitig Feedback über die Machbarkeit der geplanten Aufgaben in der angesetzten Zeit. Sprecht über eure Sprint-Ziele und gleicht Euer Qualitätsbewusstsein ab.</a:t>
+            </a:r>
+          </a:p>
+          <a:p>
+            <a:pPr algn="just">
               <a:buSzPct val="170000"/>
             </a:pPr>
             <a:endParaRPr lang="de-DE" sz="1000" dirty="0">
@@ -4199,7 +4360,7 @@
             </a:endParaRPr>
           </a:p>
           <a:p>
-            <a:pPr marL="271463" indent="-271463">
+            <a:pPr marL="271463" indent="-271463" algn="just">
               <a:buSzPct val="170000"/>
               <a:buBlip>
                 <a:blip r:embed="rId3"/>
@@ -4237,7 +4398,7 @@
             </a:r>
           </a:p>
           <a:p>
-            <a:pPr>
+            <a:pPr algn="just">
               <a:buSzPct val="170000"/>
             </a:pPr>
             <a:endParaRPr lang="de-DE" sz="1000" dirty="0">
@@ -4249,7 +4410,7 @@
             </a:endParaRPr>
           </a:p>
           <a:p>
-            <a:pPr marL="271463" indent="-271463">
+            <a:pPr marL="271463" indent="-271463" algn="just">
               <a:buSzPct val="170000"/>
               <a:buBlip>
                 <a:blip r:embed="rId3"/>
@@ -4263,16 +4424,36 @@
                 <a:latin typeface="Avenir Book"/>
                 <a:cs typeface="Avenir Book"/>
               </a:rPr>
-              <a:t>Vor Deinem aller ersten Sprint </a:t>
-            </a:r>
-            <a:r>
-              <a:rPr lang="de-DE" sz="1000">
+              <a:t>Das Sprint </a:t>
+            </a:r>
+            <a:r>
+              <a:rPr lang="de-DE" sz="1000" dirty="0" err="1">
                 <a:solidFill>
                   <a:srgbClr val="747982"/>
                 </a:solidFill>
                 <a:latin typeface="Avenir Book"/>
                 <a:cs typeface="Avenir Book"/>
               </a:rPr>
+              <a:t>Planning</a:t>
+            </a:r>
+            <a:r>
+              <a:rPr lang="de-DE" sz="1000" dirty="0">
+                <a:solidFill>
+                  <a:srgbClr val="747982"/>
+                </a:solidFill>
+                <a:latin typeface="Avenir Book"/>
+                <a:cs typeface="Avenir Book"/>
+              </a:rPr>
+              <a:t> kann und sollte mit anderen Trainingskarten trainiert werden, die damit in Zusammenhang stehen. Vor Deinem aller ersten Sprint </a:t>
+            </a:r>
+            <a:r>
+              <a:rPr lang="de-DE" sz="1000" dirty="0" err="1">
+                <a:solidFill>
+                  <a:srgbClr val="747982"/>
+                </a:solidFill>
+                <a:latin typeface="Avenir Book"/>
+                <a:cs typeface="Avenir Book"/>
+              </a:rPr>
               <a:t>Planing</a:t>
             </a:r>
             <a:r>
@@ -4283,7 +4464,7 @@
                 <a:latin typeface="Avenir Book"/>
                 <a:cs typeface="Avenir Book"/>
               </a:rPr>
-              <a:t> solltest Du ein Treffen organisieren, in dem Ihr Euch über eure Definition </a:t>
+              <a:t> kannst Du beispielsweise ein Treffen organisieren, in dem Ihr über Eure Definition </a:t>
             </a:r>
             <a:r>
               <a:rPr lang="de-DE" sz="1000" dirty="0" err="1">
@@ -4323,7 +4504,7 @@
                 <a:latin typeface="Avenir Book"/>
                 <a:cs typeface="Avenir Book"/>
               </a:rPr>
-              <a:t> (siehe SCR 04) unterhaltet um herauszufinden, was für Euch die Stadien sind, durch die eine Phrase (siehe SCR 03) laufen muss.</a:t>
+              <a:t> (siehe SCR 04) diskutiert, um herauszufinden, was Eure Qualitätsstandards sind und wann ihr definiert mit Eurer Arbeit fertig zu sein.</a:t>
             </a:r>
           </a:p>
         </p:txBody>
@@ -4398,7 +4579,7 @@
           </a:ln>
           <a:extLst>
             <a:ext uri="{C572A759-6A51-4108-AA02-DFA0A04FC94B}">
-              <ma14:wrappingTextBoxFlag xmlns="" xmlns:ma14="http://schemas.microsoft.com/office/mac/drawingml/2011/main" val="1"/>
+              <ma14:wrappingTextBoxFlag xmlns:ma14="http://schemas.microsoft.com/office/mac/drawingml/2011/main" xmlns="" val="1"/>
             </a:ext>
           </a:extLst>
         </p:spPr>

</xml_diff>